<commit_message>
update the ppt and adding insterra.ai
</commit_message>
<xml_diff>
--- a/public/SITnovatePresentationTemplate.pptx
+++ b/public/SITnovatePresentationTemplate.pptx
@@ -12,13 +12,18 @@
     <p:sldId id="260" r:id="rId6"/>
     <p:sldId id="261" r:id="rId7"/>
     <p:sldId id="262" r:id="rId8"/>
+    <p:sldId id="263" r:id="rId9"/>
   </p:sldIdLst>
   <p:sldSz cx="18288000" cy="10287000"/>
   <p:notesSz cx="6858000" cy="9144000"/>
   <p:embeddedFontLst>
     <p:embeddedFont>
+      <p:font typeface="Canva Sans" panose="020B0604020202020204" charset="0"/>
+      <p:regular r:id="rId10"/>
+    </p:embeddedFont>
+    <p:embeddedFont>
       <p:font typeface="Times New Roman Bold"/>
-      <p:regular r:id="rId9"/>
+      <p:regular r:id="rId11"/>
     </p:embeddedFont>
   </p:embeddedFontLst>
   <p:defaultTextStyle>
@@ -315,7 +320,7 @@
             <a:fld id="{1D8BD707-D9CF-40AE-B4C6-C98DA3205C09}" type="datetimeFigureOut">
               <a:rPr lang="en-US" smtClean="0"/>
               <a:pPr/>
-              <a:t>2/14/2025</a:t>
+              <a:t>2/15/2025</a:t>
             </a:fld>
             <a:endParaRPr lang="en-US"/>
           </a:p>
@@ -480,7 +485,7 @@
             <a:fld id="{1D8BD707-D9CF-40AE-B4C6-C98DA3205C09}" type="datetimeFigureOut">
               <a:rPr lang="en-US" smtClean="0"/>
               <a:pPr/>
-              <a:t>2/14/2025</a:t>
+              <a:t>2/15/2025</a:t>
             </a:fld>
             <a:endParaRPr lang="en-US"/>
           </a:p>
@@ -655,7 +660,7 @@
             <a:fld id="{1D8BD707-D9CF-40AE-B4C6-C98DA3205C09}" type="datetimeFigureOut">
               <a:rPr lang="en-US" smtClean="0"/>
               <a:pPr/>
-              <a:t>2/14/2025</a:t>
+              <a:t>2/15/2025</a:t>
             </a:fld>
             <a:endParaRPr lang="en-US"/>
           </a:p>
@@ -820,7 +825,7 @@
             <a:fld id="{1D8BD707-D9CF-40AE-B4C6-C98DA3205C09}" type="datetimeFigureOut">
               <a:rPr lang="en-US" smtClean="0"/>
               <a:pPr/>
-              <a:t>2/14/2025</a:t>
+              <a:t>2/15/2025</a:t>
             </a:fld>
             <a:endParaRPr lang="en-US"/>
           </a:p>
@@ -1062,7 +1067,7 @@
             <a:fld id="{1D8BD707-D9CF-40AE-B4C6-C98DA3205C09}" type="datetimeFigureOut">
               <a:rPr lang="en-US" smtClean="0"/>
               <a:pPr/>
-              <a:t>2/14/2025</a:t>
+              <a:t>2/15/2025</a:t>
             </a:fld>
             <a:endParaRPr lang="en-US"/>
           </a:p>
@@ -1344,7 +1349,7 @@
             <a:fld id="{1D8BD707-D9CF-40AE-B4C6-C98DA3205C09}" type="datetimeFigureOut">
               <a:rPr lang="en-US" smtClean="0"/>
               <a:pPr/>
-              <a:t>2/14/2025</a:t>
+              <a:t>2/15/2025</a:t>
             </a:fld>
             <a:endParaRPr lang="en-US"/>
           </a:p>
@@ -1760,7 +1765,7 @@
             <a:fld id="{1D8BD707-D9CF-40AE-B4C6-C98DA3205C09}" type="datetimeFigureOut">
               <a:rPr lang="en-US" smtClean="0"/>
               <a:pPr/>
-              <a:t>2/14/2025</a:t>
+              <a:t>2/15/2025</a:t>
             </a:fld>
             <a:endParaRPr lang="en-US"/>
           </a:p>
@@ -1874,7 +1879,7 @@
             <a:fld id="{1D8BD707-D9CF-40AE-B4C6-C98DA3205C09}" type="datetimeFigureOut">
               <a:rPr lang="en-US" smtClean="0"/>
               <a:pPr/>
-              <a:t>2/14/2025</a:t>
+              <a:t>2/15/2025</a:t>
             </a:fld>
             <a:endParaRPr lang="en-US"/>
           </a:p>
@@ -1966,7 +1971,7 @@
             <a:fld id="{1D8BD707-D9CF-40AE-B4C6-C98DA3205C09}" type="datetimeFigureOut">
               <a:rPr lang="en-US" smtClean="0"/>
               <a:pPr/>
-              <a:t>2/14/2025</a:t>
+              <a:t>2/15/2025</a:t>
             </a:fld>
             <a:endParaRPr lang="en-US"/>
           </a:p>
@@ -2238,7 +2243,7 @@
             <a:fld id="{1D8BD707-D9CF-40AE-B4C6-C98DA3205C09}" type="datetimeFigureOut">
               <a:rPr lang="en-US" smtClean="0"/>
               <a:pPr/>
-              <a:t>2/14/2025</a:t>
+              <a:t>2/15/2025</a:t>
             </a:fld>
             <a:endParaRPr lang="en-US"/>
           </a:p>
@@ -2487,7 +2492,7 @@
             <a:fld id="{1D8BD707-D9CF-40AE-B4C6-C98DA3205C09}" type="datetimeFigureOut">
               <a:rPr lang="en-US" smtClean="0"/>
               <a:pPr/>
-              <a:t>2/14/2025</a:t>
+              <a:t>2/15/2025</a:t>
             </a:fld>
             <a:endParaRPr lang="en-US"/>
           </a:p>
@@ -2695,7 +2700,7 @@
             <a:fld id="{1D8BD707-D9CF-40AE-B4C6-C98DA3205C09}" type="datetimeFigureOut">
               <a:rPr lang="en-US" smtClean="0"/>
               <a:pPr/>
-              <a:t>2/14/2025</a:t>
+              <a:t>2/15/2025</a:t>
             </a:fld>
             <a:endParaRPr lang="en-US"/>
           </a:p>
@@ -3119,6 +3124,13 @@
               <a:srgbClr val="8B0000"/>
             </a:solidFill>
           </p:spPr>
+          <p:txBody>
+            <a:bodyPr/>
+            <a:lstStyle/>
+            <a:p>
+              <a:endParaRPr lang="en-IN"/>
+            </a:p>
+          </p:txBody>
         </p:sp>
         <p:sp>
           <p:nvSpPr>
@@ -3205,6 +3217,13 @@
               <a:srgbClr val="8B0000"/>
             </a:solidFill>
           </p:spPr>
+          <p:txBody>
+            <a:bodyPr/>
+            <a:lstStyle/>
+            <a:p>
+              <a:endParaRPr lang="en-IN"/>
+            </a:p>
+          </p:txBody>
         </p:sp>
         <p:sp>
           <p:nvSpPr>
@@ -3283,6 +3302,13 @@
             </a:stretch>
           </a:blipFill>
         </p:spPr>
+        <p:txBody>
+          <a:bodyPr/>
+          <a:lstStyle/>
+          <a:p>
+            <a:endParaRPr lang="en-IN"/>
+          </a:p>
+        </p:txBody>
       </p:sp>
       <p:sp>
         <p:nvSpPr>
@@ -3293,14 +3319,14 @@
         <p:spPr>
           <a:xfrm>
             <a:off x="1954644" y="3322147"/>
-            <a:ext cx="11075556" cy="2095574"/>
+            <a:ext cx="8218568" cy="2199962"/>
           </a:xfrm>
           <a:prstGeom prst="rect">
             <a:avLst/>
           </a:prstGeom>
         </p:spPr>
         <p:txBody>
-          <a:bodyPr wrap="square" lIns="0" tIns="0" rIns="0" bIns="0" rtlCol="0" anchor="t">
+          <a:bodyPr lIns="0" tIns="0" rIns="0" bIns="0" rtlCol="0" anchor="t">
             <a:spAutoFit/>
           </a:bodyPr>
           <a:lstStyle/>
@@ -3313,13 +3339,13 @@
               <a:buChar char="•"/>
             </a:pPr>
             <a:r>
-              <a:rPr lang="en-US" sz="4015" b="1" dirty="0">
+              <a:rPr lang="en-US" sz="4015" b="1">
                 <a:solidFill>
                   <a:srgbClr val="000000"/>
                 </a:solidFill>
-                <a:latin typeface="Times New Roman" panose="02020603050405020304" pitchFamily="18" charset="0"/>
+                <a:latin typeface="Times New Roman Bold"/>
                 <a:ea typeface="Times New Roman Bold"/>
-                <a:cs typeface="Times New Roman" panose="02020603050405020304" pitchFamily="18" charset="0"/>
+                <a:cs typeface="Times New Roman Bold"/>
                 <a:sym typeface="Times New Roman Bold"/>
               </a:rPr>
               <a:t>Team Name (Registered on portal)</a:t>
@@ -3334,13 +3360,13 @@
               <a:buChar char="•"/>
             </a:pPr>
             <a:r>
-              <a:rPr lang="en-US" sz="4015" b="1" dirty="0">
+              <a:rPr lang="en-US" sz="4015" b="1">
                 <a:solidFill>
                   <a:srgbClr val="000000"/>
                 </a:solidFill>
-                <a:latin typeface="Times New Roman" panose="02020603050405020304" pitchFamily="18" charset="0"/>
+                <a:latin typeface="Times New Roman Bold"/>
                 <a:ea typeface="Times New Roman Bold"/>
-                <a:cs typeface="Times New Roman" panose="02020603050405020304" pitchFamily="18" charset="0"/>
+                <a:cs typeface="Times New Roman Bold"/>
                 <a:sym typeface="Times New Roman Bold"/>
               </a:rPr>
               <a:t>Problem Statement </a:t>
@@ -3355,13 +3381,13 @@
               <a:buChar char="•"/>
             </a:pPr>
             <a:r>
-              <a:rPr lang="en-US" sz="4015" b="1" dirty="0">
+              <a:rPr lang="en-US" sz="4015" b="1">
                 <a:solidFill>
                   <a:srgbClr val="000000"/>
                 </a:solidFill>
-                <a:latin typeface="Times New Roman" panose="02020603050405020304" pitchFamily="18" charset="0"/>
+                <a:latin typeface="Times New Roman Bold"/>
                 <a:ea typeface="Times New Roman Bold"/>
-                <a:cs typeface="Times New Roman" panose="02020603050405020304" pitchFamily="18" charset="0"/>
+                <a:cs typeface="Times New Roman Bold"/>
                 <a:sym typeface="Times New Roman Bold"/>
               </a:rPr>
               <a:t>Problem Statement Title</a:t>
@@ -3439,6 +3465,13 @@
             </a:stretch>
           </a:blipFill>
         </p:spPr>
+        <p:txBody>
+          <a:bodyPr/>
+          <a:lstStyle/>
+          <a:p>
+            <a:endParaRPr lang="en-IN"/>
+          </a:p>
+        </p:txBody>
       </p:sp>
       <p:sp>
         <p:nvSpPr>
@@ -3448,8 +3481,8 @@
         </p:nvSpPr>
         <p:spPr>
           <a:xfrm>
-            <a:off x="1838919" y="2836351"/>
-            <a:ext cx="7958501" cy="4499999"/>
+            <a:off x="1838919" y="2845876"/>
+            <a:ext cx="7958501" cy="4490474"/>
           </a:xfrm>
           <a:prstGeom prst="rect">
             <a:avLst/>
@@ -3469,7 +3502,7 @@
                 <a:spcPct val="0"/>
               </a:spcBef>
             </a:pPr>
-            <a:endParaRPr dirty="0"/>
+            <a:endParaRPr/>
           </a:p>
           <a:p>
             <a:pPr algn="l">
@@ -3481,7 +3514,7 @@
               </a:spcBef>
             </a:pPr>
             <a:r>
-              <a:rPr lang="en-US" sz="2822" dirty="0">
+              <a:rPr lang="en-US" sz="2822">
                 <a:solidFill>
                   <a:srgbClr val="000000"/>
                 </a:solidFill>
@@ -3502,7 +3535,7 @@
                 <a:spcPct val="0"/>
               </a:spcBef>
             </a:pPr>
-            <a:endParaRPr lang="en-US" sz="2822" dirty="0">
+            <a:endParaRPr lang="en-US" sz="2822">
               <a:solidFill>
                 <a:srgbClr val="000000"/>
               </a:solidFill>
@@ -3521,7 +3554,7 @@
                 <a:spcPct val="0"/>
               </a:spcBef>
             </a:pPr>
-            <a:endParaRPr lang="en-US" sz="2822" dirty="0">
+            <a:endParaRPr lang="en-US" sz="2822">
               <a:solidFill>
                 <a:srgbClr val="000000"/>
               </a:solidFill>
@@ -3540,7 +3573,7 @@
                 <a:spcPct val="0"/>
               </a:spcBef>
             </a:pPr>
-            <a:endParaRPr lang="en-US" sz="2822" dirty="0">
+            <a:endParaRPr lang="en-US" sz="2822">
               <a:solidFill>
                 <a:srgbClr val="000000"/>
               </a:solidFill>
@@ -3560,7 +3593,7 @@
               </a:spcBef>
             </a:pPr>
             <a:r>
-              <a:rPr lang="en-US" sz="2822" dirty="0">
+              <a:rPr lang="en-US" sz="2822">
                 <a:solidFill>
                   <a:srgbClr val="000000"/>
                 </a:solidFill>
@@ -3581,7 +3614,7 @@
               <a:buChar char="•"/>
             </a:pPr>
             <a:r>
-              <a:rPr lang="en-US" sz="2822" dirty="0">
+              <a:rPr lang="en-US" sz="2822">
                 <a:solidFill>
                   <a:srgbClr val="000000"/>
                 </a:solidFill>
@@ -3602,7 +3635,7 @@
               <a:buChar char="•"/>
             </a:pPr>
             <a:r>
-              <a:rPr lang="en-US" sz="2822" dirty="0">
+              <a:rPr lang="en-US" sz="2822">
                 <a:solidFill>
                   <a:srgbClr val="000000"/>
                 </a:solidFill>
@@ -3623,7 +3656,7 @@
               <a:buChar char="•"/>
             </a:pPr>
             <a:r>
-              <a:rPr lang="en-US" sz="2822" dirty="0">
+              <a:rPr lang="en-US" sz="2822">
                 <a:solidFill>
                   <a:srgbClr val="000000"/>
                 </a:solidFill>
@@ -3646,7 +3679,7 @@
         <p:spPr>
           <a:xfrm>
             <a:off x="7462507" y="885825"/>
-            <a:ext cx="3362986" cy="588366"/>
+            <a:ext cx="3362986" cy="680741"/>
           </a:xfrm>
           <a:prstGeom prst="rect">
             <a:avLst/>
@@ -3667,7 +3700,7 @@
               </a:spcBef>
             </a:pPr>
             <a:r>
-              <a:rPr lang="en-US" sz="3576" b="1" dirty="0">
+              <a:rPr lang="en-US" sz="3576">
                 <a:solidFill>
                   <a:srgbClr val="000000"/>
                 </a:solidFill>
@@ -3679,13 +3712,13 @@
               <a:t> </a:t>
             </a:r>
             <a:r>
-              <a:rPr lang="en-US" sz="3576" b="1" dirty="0">
+              <a:rPr lang="en-US" sz="3576" b="1">
                 <a:solidFill>
                   <a:srgbClr val="000000"/>
                 </a:solidFill>
-                <a:latin typeface="Times New Roman" panose="02020603050405020304" pitchFamily="18" charset="0"/>
+                <a:latin typeface="Times New Roman Bold"/>
                 <a:ea typeface="Times New Roman Bold"/>
-                <a:cs typeface="Times New Roman" panose="02020603050405020304" pitchFamily="18" charset="0"/>
+                <a:cs typeface="Times New Roman Bold"/>
                 <a:sym typeface="Times New Roman Bold"/>
               </a:rPr>
               <a:t>Innovation</a:t>
@@ -3746,6 +3779,13 @@
               <a:srgbClr val="8B0000"/>
             </a:solidFill>
           </p:spPr>
+          <p:txBody>
+            <a:bodyPr/>
+            <a:lstStyle/>
+            <a:p>
+              <a:endParaRPr lang="en-IN"/>
+            </a:p>
+          </p:txBody>
         </p:sp>
         <p:sp>
           <p:nvSpPr>
@@ -3832,6 +3872,13 @@
               <a:srgbClr val="8B0000"/>
             </a:solidFill>
           </p:spPr>
+          <p:txBody>
+            <a:bodyPr/>
+            <a:lstStyle/>
+            <a:p>
+              <a:endParaRPr lang="en-IN"/>
+            </a:p>
+          </p:txBody>
         </p:sp>
         <p:sp>
           <p:nvSpPr>
@@ -3910,6 +3957,13 @@
             </a:stretch>
           </a:blipFill>
         </p:spPr>
+        <p:txBody>
+          <a:bodyPr/>
+          <a:lstStyle/>
+          <a:p>
+            <a:endParaRPr lang="en-IN"/>
+          </a:p>
+        </p:txBody>
       </p:sp>
     </p:spTree>
   </p:cSld>
@@ -3989,6 +4043,13 @@
               <a:srgbClr val="8B0000"/>
             </a:solidFill>
           </p:spPr>
+          <p:txBody>
+            <a:bodyPr/>
+            <a:lstStyle/>
+            <a:p>
+              <a:endParaRPr lang="en-IN"/>
+            </a:p>
+          </p:txBody>
         </p:sp>
         <p:sp>
           <p:nvSpPr>
@@ -4075,6 +4136,13 @@
               <a:srgbClr val="8B0000"/>
             </a:solidFill>
           </p:spPr>
+          <p:txBody>
+            <a:bodyPr/>
+            <a:lstStyle/>
+            <a:p>
+              <a:endParaRPr lang="en-IN"/>
+            </a:p>
+          </p:txBody>
         </p:sp>
         <p:sp>
           <p:nvSpPr>
@@ -4153,6 +4221,13 @@
             </a:stretch>
           </a:blipFill>
         </p:spPr>
+        <p:txBody>
+          <a:bodyPr/>
+          <a:lstStyle/>
+          <a:p>
+            <a:endParaRPr lang="en-IN"/>
+          </a:p>
+        </p:txBody>
       </p:sp>
       <p:sp>
         <p:nvSpPr>
@@ -4349,14 +4424,14 @@
         <p:spPr>
           <a:xfrm>
             <a:off x="7516812" y="895350"/>
-            <a:ext cx="3913188" cy="576504"/>
+            <a:ext cx="3254375" cy="663576"/>
           </a:xfrm>
           <a:prstGeom prst="rect">
             <a:avLst/>
           </a:prstGeom>
         </p:spPr>
         <p:txBody>
-          <a:bodyPr wrap="square" lIns="0" tIns="0" rIns="0" bIns="0" rtlCol="0" anchor="t">
+          <a:bodyPr lIns="0" tIns="0" rIns="0" bIns="0" rtlCol="0" anchor="t">
             <a:spAutoFit/>
           </a:bodyPr>
           <a:lstStyle/>
@@ -4370,13 +4445,13 @@
               </a:spcBef>
             </a:pPr>
             <a:r>
-              <a:rPr lang="en-US" sz="3499" b="1" dirty="0">
+              <a:rPr lang="en-US" sz="3499" b="1">
                 <a:solidFill>
                   <a:srgbClr val="000000"/>
                 </a:solidFill>
-                <a:latin typeface="Times New Roman" panose="02020603050405020304" pitchFamily="18" charset="0"/>
+                <a:latin typeface="Times New Roman Bold"/>
                 <a:ea typeface="Times New Roman Bold"/>
-                <a:cs typeface="Times New Roman" panose="02020603050405020304" pitchFamily="18" charset="0"/>
+                <a:cs typeface="Times New Roman Bold"/>
                 <a:sym typeface="Times New Roman Bold"/>
               </a:rPr>
               <a:t>Idea Presentation</a:t>
@@ -4462,6 +4537,13 @@
               <a:srgbClr val="8B0000"/>
             </a:solidFill>
           </p:spPr>
+          <p:txBody>
+            <a:bodyPr/>
+            <a:lstStyle/>
+            <a:p>
+              <a:endParaRPr lang="en-IN"/>
+            </a:p>
+          </p:txBody>
         </p:sp>
         <p:sp>
           <p:nvSpPr>
@@ -4548,6 +4630,13 @@
               <a:srgbClr val="8B0000"/>
             </a:solidFill>
           </p:spPr>
+          <p:txBody>
+            <a:bodyPr/>
+            <a:lstStyle/>
+            <a:p>
+              <a:endParaRPr lang="en-IN"/>
+            </a:p>
+          </p:txBody>
         </p:sp>
         <p:sp>
           <p:nvSpPr>
@@ -4626,6 +4715,13 @@
             </a:stretch>
           </a:blipFill>
         </p:spPr>
+        <p:txBody>
+          <a:bodyPr/>
+          <a:lstStyle/>
+          <a:p>
+            <a:endParaRPr lang="en-IN"/>
+          </a:p>
+        </p:txBody>
       </p:sp>
       <p:sp>
         <p:nvSpPr>
@@ -4841,14 +4937,14 @@
         <p:spPr>
           <a:xfrm>
             <a:off x="6862117" y="895350"/>
-            <a:ext cx="5558483" cy="576504"/>
+            <a:ext cx="4792431" cy="663576"/>
           </a:xfrm>
           <a:prstGeom prst="rect">
             <a:avLst/>
           </a:prstGeom>
         </p:spPr>
         <p:txBody>
-          <a:bodyPr wrap="square" lIns="0" tIns="0" rIns="0" bIns="0" rtlCol="0" anchor="t">
+          <a:bodyPr lIns="0" tIns="0" rIns="0" bIns="0" rtlCol="0" anchor="t">
             <a:spAutoFit/>
           </a:bodyPr>
           <a:lstStyle/>
@@ -4862,19 +4958,7 @@
               </a:spcBef>
             </a:pPr>
             <a:r>
-              <a:rPr lang="en-US" sz="3499" b="1" dirty="0">
-                <a:solidFill>
-                  <a:srgbClr val="000000"/>
-                </a:solidFill>
-                <a:latin typeface="Times New Roman" panose="02020603050405020304" pitchFamily="18" charset="0"/>
-                <a:ea typeface="Times New Roman Bold"/>
-                <a:cs typeface="Times New Roman" panose="02020603050405020304" pitchFamily="18" charset="0"/>
-                <a:sym typeface="Times New Roman Bold"/>
-              </a:rPr>
-              <a:t>Technical</a:t>
-            </a:r>
-            <a:r>
-              <a:rPr lang="en-US" sz="3499" b="1" dirty="0">
+              <a:rPr lang="en-US" sz="3499" b="1">
                 <a:solidFill>
                   <a:srgbClr val="000000"/>
                 </a:solidFill>
@@ -4883,7 +4967,7 @@
                 <a:cs typeface="Times New Roman Bold"/>
                 <a:sym typeface="Times New Roman Bold"/>
               </a:rPr>
-              <a:t> Implementation</a:t>
+              <a:t>Technical Implementation</a:t>
             </a:r>
           </a:p>
         </p:txBody>
@@ -4966,6 +5050,13 @@
               <a:srgbClr val="8B0000"/>
             </a:solidFill>
           </p:spPr>
+          <p:txBody>
+            <a:bodyPr/>
+            <a:lstStyle/>
+            <a:p>
+              <a:endParaRPr lang="en-IN"/>
+            </a:p>
+          </p:txBody>
         </p:sp>
         <p:sp>
           <p:nvSpPr>
@@ -5052,6 +5143,13 @@
               <a:srgbClr val="8B0000"/>
             </a:solidFill>
           </p:spPr>
+          <p:txBody>
+            <a:bodyPr/>
+            <a:lstStyle/>
+            <a:p>
+              <a:endParaRPr lang="en-IN"/>
+            </a:p>
+          </p:txBody>
         </p:sp>
         <p:sp>
           <p:nvSpPr>
@@ -5130,6 +5228,13 @@
             </a:stretch>
           </a:blipFill>
         </p:spPr>
+        <p:txBody>
+          <a:bodyPr/>
+          <a:lstStyle/>
+          <a:p>
+            <a:endParaRPr lang="en-IN"/>
+          </a:p>
+        </p:txBody>
       </p:sp>
       <p:sp>
         <p:nvSpPr>
@@ -5337,14 +5442,14 @@
         <p:spPr>
           <a:xfrm>
             <a:off x="8097656" y="895350"/>
-            <a:ext cx="2754746" cy="576504"/>
+            <a:ext cx="2092689" cy="663576"/>
           </a:xfrm>
           <a:prstGeom prst="rect">
             <a:avLst/>
           </a:prstGeom>
         </p:spPr>
         <p:txBody>
-          <a:bodyPr wrap="square" lIns="0" tIns="0" rIns="0" bIns="0" rtlCol="0" anchor="t">
+          <a:bodyPr lIns="0" tIns="0" rIns="0" bIns="0" rtlCol="0" anchor="t">
             <a:spAutoFit/>
           </a:bodyPr>
           <a:lstStyle/>
@@ -5358,7 +5463,7 @@
               </a:spcBef>
             </a:pPr>
             <a:r>
-              <a:rPr lang="en-US" sz="3499" b="1" dirty="0">
+              <a:rPr lang="en-US" sz="3499" b="1">
                 <a:solidFill>
                   <a:srgbClr val="000000"/>
                 </a:solidFill>
@@ -5367,19 +5472,7 @@
                 <a:cs typeface="Times New Roman Bold"/>
                 <a:sym typeface="Times New Roman Bold"/>
               </a:rPr>
-              <a:t> </a:t>
-            </a:r>
-            <a:r>
-              <a:rPr lang="en-US" sz="3499" b="1" dirty="0">
-                <a:solidFill>
-                  <a:srgbClr val="000000"/>
-                </a:solidFill>
-                <a:latin typeface="Times New Roman" panose="02020603050405020304" pitchFamily="18" charset="0"/>
-                <a:ea typeface="Times New Roman Bold"/>
-                <a:cs typeface="Times New Roman" panose="02020603050405020304" pitchFamily="18" charset="0"/>
-                <a:sym typeface="Times New Roman Bold"/>
-              </a:rPr>
-              <a:t>Scalability</a:t>
+              <a:t> Scalability</a:t>
             </a:r>
           </a:p>
         </p:txBody>
@@ -5462,6 +5555,13 @@
               <a:srgbClr val="8B0000"/>
             </a:solidFill>
           </p:spPr>
+          <p:txBody>
+            <a:bodyPr/>
+            <a:lstStyle/>
+            <a:p>
+              <a:endParaRPr lang="en-IN"/>
+            </a:p>
+          </p:txBody>
         </p:sp>
         <p:sp>
           <p:nvSpPr>
@@ -5548,6 +5648,13 @@
               <a:srgbClr val="8B0000"/>
             </a:solidFill>
           </p:spPr>
+          <p:txBody>
+            <a:bodyPr/>
+            <a:lstStyle/>
+            <a:p>
+              <a:endParaRPr lang="en-IN"/>
+            </a:p>
+          </p:txBody>
         </p:sp>
         <p:sp>
           <p:nvSpPr>
@@ -5626,6 +5733,13 @@
             </a:stretch>
           </a:blipFill>
         </p:spPr>
+        <p:txBody>
+          <a:bodyPr/>
+          <a:lstStyle/>
+          <a:p>
+            <a:endParaRPr lang="en-IN"/>
+          </a:p>
+        </p:txBody>
       </p:sp>
       <p:sp>
         <p:nvSpPr>
@@ -5861,14 +5975,14 @@
         <p:spPr>
           <a:xfrm>
             <a:off x="8438059" y="895350"/>
-            <a:ext cx="2077541" cy="576504"/>
+            <a:ext cx="1411883" cy="663576"/>
           </a:xfrm>
           <a:prstGeom prst="rect">
             <a:avLst/>
           </a:prstGeom>
         </p:spPr>
         <p:txBody>
-          <a:bodyPr wrap="square" lIns="0" tIns="0" rIns="0" bIns="0" rtlCol="0" anchor="t">
+          <a:bodyPr lIns="0" tIns="0" rIns="0" bIns="0" rtlCol="0" anchor="t">
             <a:spAutoFit/>
           </a:bodyPr>
           <a:lstStyle/>
@@ -5882,7 +5996,7 @@
               </a:spcBef>
             </a:pPr>
             <a:r>
-              <a:rPr lang="en-US" sz="3499" dirty="0">
+              <a:rPr lang="en-US" sz="3499">
                 <a:solidFill>
                   <a:srgbClr val="000000"/>
                 </a:solidFill>
@@ -5894,13 +6008,13 @@
               <a:t> </a:t>
             </a:r>
             <a:r>
-              <a:rPr lang="en-US" sz="3499" b="1" dirty="0">
+              <a:rPr lang="en-US" sz="3499" b="1">
                 <a:solidFill>
                   <a:srgbClr val="000000"/>
                 </a:solidFill>
-                <a:latin typeface="Times New Roman" panose="02020603050405020304" pitchFamily="18" charset="0"/>
+                <a:latin typeface="Times New Roman Bold"/>
                 <a:ea typeface="Times New Roman Bold"/>
-                <a:cs typeface="Times New Roman" panose="02020603050405020304" pitchFamily="18" charset="0"/>
+                <a:cs typeface="Times New Roman Bold"/>
                 <a:sym typeface="Times New Roman Bold"/>
               </a:rPr>
               <a:t>Impact</a:t>
@@ -5917,6 +6031,944 @@
 </file>
 
 <file path=ppt/slides/slide7.xml><?xml version="1.0" encoding="utf-8"?>
+<p:sld xmlns:a="http://schemas.openxmlformats.org/drawingml/2006/main" xmlns:r="http://schemas.openxmlformats.org/officeDocument/2006/relationships" xmlns:p="http://schemas.openxmlformats.org/presentationml/2006/main">
+  <p:cSld>
+    <p:spTree>
+      <p:nvGrpSpPr>
+        <p:cNvPr id="1" name=""/>
+        <p:cNvGrpSpPr/>
+        <p:nvPr/>
+      </p:nvGrpSpPr>
+      <p:grpSpPr>
+        <a:xfrm>
+          <a:off x="0" y="0"/>
+          <a:ext cx="0" cy="0"/>
+          <a:chOff x="0" y="0"/>
+          <a:chExt cx="0" cy="0"/>
+        </a:xfrm>
+      </p:grpSpPr>
+      <p:grpSp>
+        <p:nvGrpSpPr>
+          <p:cNvPr id="2" name="Group 2"/>
+          <p:cNvGrpSpPr/>
+          <p:nvPr/>
+        </p:nvGrpSpPr>
+        <p:grpSpPr>
+          <a:xfrm>
+            <a:off x="-167951" y="9612018"/>
+            <a:ext cx="18288000" cy="674982"/>
+            <a:chOff x="0" y="0"/>
+            <a:chExt cx="4816593" cy="177773"/>
+          </a:xfrm>
+        </p:grpSpPr>
+        <p:sp>
+          <p:nvSpPr>
+            <p:cNvPr id="3" name="Freeform 3"/>
+            <p:cNvSpPr/>
+            <p:nvPr/>
+          </p:nvSpPr>
+          <p:spPr>
+            <a:xfrm>
+              <a:off x="0" y="0"/>
+              <a:ext cx="4816592" cy="177773"/>
+            </a:xfrm>
+            <a:custGeom>
+              <a:avLst/>
+              <a:gdLst/>
+              <a:ahLst/>
+              <a:cxnLst/>
+              <a:rect l="l" t="t" r="r" b="b"/>
+              <a:pathLst>
+                <a:path w="4816592" h="177773">
+                  <a:moveTo>
+                    <a:pt x="0" y="0"/>
+                  </a:moveTo>
+                  <a:lnTo>
+                    <a:pt x="4816592" y="0"/>
+                  </a:lnTo>
+                  <a:lnTo>
+                    <a:pt x="4816592" y="177773"/>
+                  </a:lnTo>
+                  <a:lnTo>
+                    <a:pt x="0" y="177773"/>
+                  </a:lnTo>
+                  <a:close/>
+                </a:path>
+              </a:pathLst>
+            </a:custGeom>
+            <a:solidFill>
+              <a:srgbClr val="8B0000"/>
+            </a:solidFill>
+          </p:spPr>
+          <p:txBody>
+            <a:bodyPr/>
+            <a:lstStyle/>
+            <a:p>
+              <a:endParaRPr lang="en-IN"/>
+            </a:p>
+          </p:txBody>
+        </p:sp>
+        <p:sp>
+          <p:nvSpPr>
+            <p:cNvPr id="4" name="TextBox 4"/>
+            <p:cNvSpPr txBox="1"/>
+            <p:nvPr/>
+          </p:nvSpPr>
+          <p:spPr>
+            <a:xfrm>
+              <a:off x="0" y="-38100"/>
+              <a:ext cx="4816593" cy="215873"/>
+            </a:xfrm>
+            <a:prstGeom prst="rect">
+              <a:avLst/>
+            </a:prstGeom>
+          </p:spPr>
+          <p:txBody>
+            <a:bodyPr lIns="50800" tIns="50800" rIns="50800" bIns="50800" rtlCol="0" anchor="ctr"/>
+            <a:lstStyle/>
+            <a:p>
+              <a:pPr algn="ctr">
+                <a:lnSpc>
+                  <a:spcPts val="2659"/>
+                </a:lnSpc>
+                <a:spcBef>
+                  <a:spcPct val="0"/>
+                </a:spcBef>
+              </a:pPr>
+              <a:endParaRPr/>
+            </a:p>
+          </p:txBody>
+        </p:sp>
+      </p:grpSp>
+      <p:grpSp>
+        <p:nvGrpSpPr>
+          <p:cNvPr id="5" name="Group 5"/>
+          <p:cNvGrpSpPr/>
+          <p:nvPr/>
+        </p:nvGrpSpPr>
+        <p:grpSpPr>
+          <a:xfrm>
+            <a:off x="-167951" y="0"/>
+            <a:ext cx="18288000" cy="725655"/>
+            <a:chOff x="0" y="0"/>
+            <a:chExt cx="4816593" cy="191119"/>
+          </a:xfrm>
+        </p:grpSpPr>
+        <p:sp>
+          <p:nvSpPr>
+            <p:cNvPr id="6" name="Freeform 6"/>
+            <p:cNvSpPr/>
+            <p:nvPr/>
+          </p:nvSpPr>
+          <p:spPr>
+            <a:xfrm>
+              <a:off x="0" y="0"/>
+              <a:ext cx="4816592" cy="191119"/>
+            </a:xfrm>
+            <a:custGeom>
+              <a:avLst/>
+              <a:gdLst/>
+              <a:ahLst/>
+              <a:cxnLst/>
+              <a:rect l="l" t="t" r="r" b="b"/>
+              <a:pathLst>
+                <a:path w="4816592" h="191119">
+                  <a:moveTo>
+                    <a:pt x="0" y="0"/>
+                  </a:moveTo>
+                  <a:lnTo>
+                    <a:pt x="4816592" y="0"/>
+                  </a:lnTo>
+                  <a:lnTo>
+                    <a:pt x="4816592" y="191119"/>
+                  </a:lnTo>
+                  <a:lnTo>
+                    <a:pt x="0" y="191119"/>
+                  </a:lnTo>
+                  <a:close/>
+                </a:path>
+              </a:pathLst>
+            </a:custGeom>
+            <a:solidFill>
+              <a:srgbClr val="8B0000"/>
+            </a:solidFill>
+          </p:spPr>
+          <p:txBody>
+            <a:bodyPr/>
+            <a:lstStyle/>
+            <a:p>
+              <a:endParaRPr lang="en-IN"/>
+            </a:p>
+          </p:txBody>
+        </p:sp>
+        <p:sp>
+          <p:nvSpPr>
+            <p:cNvPr id="7" name="TextBox 7"/>
+            <p:cNvSpPr txBox="1"/>
+            <p:nvPr/>
+          </p:nvSpPr>
+          <p:spPr>
+            <a:xfrm>
+              <a:off x="0" y="-38100"/>
+              <a:ext cx="4816593" cy="229219"/>
+            </a:xfrm>
+            <a:prstGeom prst="rect">
+              <a:avLst/>
+            </a:prstGeom>
+          </p:spPr>
+          <p:txBody>
+            <a:bodyPr lIns="50800" tIns="50800" rIns="50800" bIns="50800" rtlCol="0" anchor="ctr"/>
+            <a:lstStyle/>
+            <a:p>
+              <a:pPr algn="ctr">
+                <a:lnSpc>
+                  <a:spcPts val="2659"/>
+                </a:lnSpc>
+                <a:spcBef>
+                  <a:spcPct val="0"/>
+                </a:spcBef>
+              </a:pPr>
+              <a:endParaRPr/>
+            </a:p>
+          </p:txBody>
+        </p:sp>
+      </p:grpSp>
+      <p:sp>
+        <p:nvSpPr>
+          <p:cNvPr id="8" name="Freeform 8"/>
+          <p:cNvSpPr/>
+          <p:nvPr/>
+        </p:nvSpPr>
+        <p:spPr>
+          <a:xfrm>
+            <a:off x="12507372" y="0"/>
+            <a:ext cx="5612677" cy="725655"/>
+          </a:xfrm>
+          <a:custGeom>
+            <a:avLst/>
+            <a:gdLst/>
+            <a:ahLst/>
+            <a:cxnLst/>
+            <a:rect l="l" t="t" r="r" b="b"/>
+            <a:pathLst>
+              <a:path w="5612677" h="725655">
+                <a:moveTo>
+                  <a:pt x="0" y="0"/>
+                </a:moveTo>
+                <a:lnTo>
+                  <a:pt x="5612677" y="0"/>
+                </a:lnTo>
+                <a:lnTo>
+                  <a:pt x="5612677" y="725655"/>
+                </a:lnTo>
+                <a:lnTo>
+                  <a:pt x="0" y="725655"/>
+                </a:lnTo>
+                <a:lnTo>
+                  <a:pt x="0" y="0"/>
+                </a:lnTo>
+                <a:close/>
+              </a:path>
+            </a:pathLst>
+          </a:custGeom>
+          <a:blipFill>
+            <a:blip r:embed="rId2"/>
+            <a:stretch>
+              <a:fillRect t="-12748" b="-14873"/>
+            </a:stretch>
+          </a:blipFill>
+        </p:spPr>
+        <p:txBody>
+          <a:bodyPr/>
+          <a:lstStyle/>
+          <a:p>
+            <a:endParaRPr lang="en-IN"/>
+          </a:p>
+        </p:txBody>
+      </p:sp>
+      <p:sp>
+        <p:nvSpPr>
+          <p:cNvPr id="9" name="Freeform 9"/>
+          <p:cNvSpPr/>
+          <p:nvPr/>
+        </p:nvSpPr>
+        <p:spPr>
+          <a:xfrm>
+            <a:off x="13174629" y="1769246"/>
+            <a:ext cx="2999274" cy="3004158"/>
+          </a:xfrm>
+          <a:custGeom>
+            <a:avLst/>
+            <a:gdLst/>
+            <a:ahLst/>
+            <a:cxnLst/>
+            <a:rect l="l" t="t" r="r" b="b"/>
+            <a:pathLst>
+              <a:path w="2999274" h="3004158">
+                <a:moveTo>
+                  <a:pt x="0" y="0"/>
+                </a:moveTo>
+                <a:lnTo>
+                  <a:pt x="2999274" y="0"/>
+                </a:lnTo>
+                <a:lnTo>
+                  <a:pt x="2999274" y="3004159"/>
+                </a:lnTo>
+                <a:lnTo>
+                  <a:pt x="0" y="3004159"/>
+                </a:lnTo>
+                <a:lnTo>
+                  <a:pt x="0" y="0"/>
+                </a:lnTo>
+                <a:close/>
+              </a:path>
+            </a:pathLst>
+          </a:custGeom>
+          <a:blipFill>
+            <a:blip r:embed="rId3"/>
+            <a:stretch>
+              <a:fillRect/>
+            </a:stretch>
+          </a:blipFill>
+        </p:spPr>
+        <p:txBody>
+          <a:bodyPr/>
+          <a:lstStyle/>
+          <a:p>
+            <a:endParaRPr lang="en-IN"/>
+          </a:p>
+        </p:txBody>
+      </p:sp>
+      <p:grpSp>
+        <p:nvGrpSpPr>
+          <p:cNvPr id="10" name="Group 10"/>
+          <p:cNvGrpSpPr/>
+          <p:nvPr/>
+        </p:nvGrpSpPr>
+        <p:grpSpPr>
+          <a:xfrm>
+            <a:off x="1114985" y="5289149"/>
+            <a:ext cx="3464462" cy="2180212"/>
+            <a:chOff x="0" y="0"/>
+            <a:chExt cx="912451" cy="574212"/>
+          </a:xfrm>
+        </p:grpSpPr>
+        <p:sp>
+          <p:nvSpPr>
+            <p:cNvPr id="11" name="Freeform 11"/>
+            <p:cNvSpPr/>
+            <p:nvPr/>
+          </p:nvSpPr>
+          <p:spPr>
+            <a:xfrm>
+              <a:off x="0" y="0"/>
+              <a:ext cx="912451" cy="574212"/>
+            </a:xfrm>
+            <a:custGeom>
+              <a:avLst/>
+              <a:gdLst/>
+              <a:ahLst/>
+              <a:cxnLst/>
+              <a:rect l="l" t="t" r="r" b="b"/>
+              <a:pathLst>
+                <a:path w="912451" h="574212">
+                  <a:moveTo>
+                    <a:pt x="0" y="0"/>
+                  </a:moveTo>
+                  <a:lnTo>
+                    <a:pt x="912451" y="0"/>
+                  </a:lnTo>
+                  <a:lnTo>
+                    <a:pt x="912451" y="574212"/>
+                  </a:lnTo>
+                  <a:lnTo>
+                    <a:pt x="0" y="574212"/>
+                  </a:lnTo>
+                  <a:close/>
+                </a:path>
+              </a:pathLst>
+            </a:custGeom>
+            <a:solidFill>
+              <a:srgbClr val="FFFFFF"/>
+            </a:solidFill>
+            <a:ln w="38100" cap="sq">
+              <a:solidFill>
+                <a:srgbClr val="000000"/>
+              </a:solidFill>
+              <a:prstDash val="solid"/>
+              <a:miter/>
+            </a:ln>
+          </p:spPr>
+          <p:txBody>
+            <a:bodyPr/>
+            <a:lstStyle/>
+            <a:p>
+              <a:endParaRPr lang="en-IN"/>
+            </a:p>
+          </p:txBody>
+        </p:sp>
+        <p:sp>
+          <p:nvSpPr>
+            <p:cNvPr id="12" name="TextBox 12"/>
+            <p:cNvSpPr txBox="1"/>
+            <p:nvPr/>
+          </p:nvSpPr>
+          <p:spPr>
+            <a:xfrm>
+              <a:off x="0" y="-38100"/>
+              <a:ext cx="912451" cy="612312"/>
+            </a:xfrm>
+            <a:prstGeom prst="rect">
+              <a:avLst/>
+            </a:prstGeom>
+          </p:spPr>
+          <p:txBody>
+            <a:bodyPr lIns="50800" tIns="50800" rIns="50800" bIns="50800" rtlCol="0" anchor="ctr"/>
+            <a:lstStyle/>
+            <a:p>
+              <a:pPr algn="ctr">
+                <a:lnSpc>
+                  <a:spcPts val="2659"/>
+                </a:lnSpc>
+              </a:pPr>
+              <a:r>
+                <a:rPr lang="en-US" sz="1899">
+                  <a:solidFill>
+                    <a:srgbClr val="000000"/>
+                  </a:solidFill>
+                  <a:latin typeface="Canva Sans"/>
+                  <a:ea typeface="Canva Sans"/>
+                  <a:cs typeface="Canva Sans"/>
+                  <a:sym typeface="Canva Sans"/>
+                </a:rPr>
+                <a:t>1</a:t>
+              </a:r>
+            </a:p>
+          </p:txBody>
+        </p:sp>
+      </p:grpSp>
+      <p:sp>
+        <p:nvSpPr>
+          <p:cNvPr id="13" name="TextBox 13"/>
+          <p:cNvSpPr txBox="1"/>
+          <p:nvPr/>
+        </p:nvSpPr>
+        <p:spPr>
+          <a:xfrm>
+            <a:off x="5592607" y="896176"/>
+            <a:ext cx="6766885" cy="663576"/>
+          </a:xfrm>
+          <a:prstGeom prst="rect">
+            <a:avLst/>
+          </a:prstGeom>
+        </p:spPr>
+        <p:txBody>
+          <a:bodyPr lIns="0" tIns="0" rIns="0" bIns="0" rtlCol="0" anchor="t">
+            <a:spAutoFit/>
+          </a:bodyPr>
+          <a:lstStyle/>
+          <a:p>
+            <a:pPr algn="ctr">
+              <a:lnSpc>
+                <a:spcPts val="4899"/>
+              </a:lnSpc>
+              <a:spcBef>
+                <a:spcPct val="0"/>
+              </a:spcBef>
+            </a:pPr>
+            <a:r>
+              <a:rPr lang="en-US" sz="3499" b="1">
+                <a:solidFill>
+                  <a:srgbClr val="000000"/>
+                </a:solidFill>
+                <a:latin typeface="Times New Roman Bold"/>
+                <a:ea typeface="Times New Roman Bold"/>
+                <a:cs typeface="Times New Roman Bold"/>
+                <a:sym typeface="Times New Roman Bold"/>
+              </a:rPr>
+              <a:t>Compulsory Registration on Insterra</a:t>
+            </a:r>
+          </a:p>
+        </p:txBody>
+      </p:sp>
+      <p:sp>
+        <p:nvSpPr>
+          <p:cNvPr id="14" name="TextBox 14"/>
+          <p:cNvSpPr txBox="1"/>
+          <p:nvPr/>
+        </p:nvSpPr>
+        <p:spPr>
+          <a:xfrm>
+            <a:off x="1231529" y="1970722"/>
+            <a:ext cx="8722155" cy="3263360"/>
+          </a:xfrm>
+          <a:prstGeom prst="rect">
+            <a:avLst/>
+          </a:prstGeom>
+        </p:spPr>
+        <p:txBody>
+          <a:bodyPr lIns="0" tIns="0" rIns="0" bIns="0" rtlCol="0" anchor="t">
+            <a:spAutoFit/>
+          </a:bodyPr>
+          <a:lstStyle/>
+          <a:p>
+            <a:pPr algn="l">
+              <a:lnSpc>
+                <a:spcPts val="3646"/>
+              </a:lnSpc>
+              <a:spcBef>
+                <a:spcPct val="0"/>
+              </a:spcBef>
+            </a:pPr>
+            <a:r>
+              <a:rPr lang="en-US" sz="2604" b="1">
+                <a:solidFill>
+                  <a:srgbClr val="000000"/>
+                </a:solidFill>
+                <a:latin typeface="Times New Roman Bold"/>
+                <a:ea typeface="Times New Roman Bold"/>
+                <a:cs typeface="Times New Roman Bold"/>
+                <a:sym typeface="Times New Roman Bold"/>
+              </a:rPr>
+              <a:t>Please find the QR code of insterra.ai herewith.</a:t>
+            </a:r>
+          </a:p>
+          <a:p>
+            <a:pPr algn="l">
+              <a:lnSpc>
+                <a:spcPts val="3646"/>
+              </a:lnSpc>
+              <a:spcBef>
+                <a:spcPct val="0"/>
+              </a:spcBef>
+            </a:pPr>
+            <a:endParaRPr lang="en-US" sz="2604" b="1">
+              <a:solidFill>
+                <a:srgbClr val="000000"/>
+              </a:solidFill>
+              <a:latin typeface="Times New Roman Bold"/>
+              <a:ea typeface="Times New Roman Bold"/>
+              <a:cs typeface="Times New Roman Bold"/>
+              <a:sym typeface="Times New Roman Bold"/>
+            </a:endParaRPr>
+          </a:p>
+          <a:p>
+            <a:pPr algn="l">
+              <a:lnSpc>
+                <a:spcPts val="3646"/>
+              </a:lnSpc>
+              <a:spcBef>
+                <a:spcPct val="0"/>
+              </a:spcBef>
+            </a:pPr>
+            <a:r>
+              <a:rPr lang="en-US" sz="2604" b="1" u="sng">
+                <a:solidFill>
+                  <a:srgbClr val="000000"/>
+                </a:solidFill>
+                <a:latin typeface="Times New Roman Bold"/>
+                <a:ea typeface="Times New Roman Bold"/>
+                <a:cs typeface="Times New Roman Bold"/>
+                <a:sym typeface="Times New Roman Bold"/>
+              </a:rPr>
+              <a:t>This is a Compulsory Step*</a:t>
+            </a:r>
+          </a:p>
+          <a:p>
+            <a:pPr algn="l">
+              <a:lnSpc>
+                <a:spcPts val="3646"/>
+              </a:lnSpc>
+              <a:spcBef>
+                <a:spcPct val="0"/>
+              </a:spcBef>
+            </a:pPr>
+            <a:endParaRPr lang="en-US" sz="2604" b="1" u="sng">
+              <a:solidFill>
+                <a:srgbClr val="000000"/>
+              </a:solidFill>
+              <a:latin typeface="Times New Roman Bold"/>
+              <a:ea typeface="Times New Roman Bold"/>
+              <a:cs typeface="Times New Roman Bold"/>
+              <a:sym typeface="Times New Roman Bold"/>
+            </a:endParaRPr>
+          </a:p>
+          <a:p>
+            <a:pPr algn="l">
+              <a:lnSpc>
+                <a:spcPts val="3646"/>
+              </a:lnSpc>
+              <a:spcBef>
+                <a:spcPct val="0"/>
+              </a:spcBef>
+            </a:pPr>
+            <a:r>
+              <a:rPr lang="en-US" sz="2604" b="1">
+                <a:solidFill>
+                  <a:srgbClr val="000000"/>
+                </a:solidFill>
+                <a:latin typeface="Times New Roman Bold"/>
+                <a:ea typeface="Times New Roman Bold"/>
+                <a:cs typeface="Times New Roman Bold"/>
+                <a:sym typeface="Times New Roman Bold"/>
+              </a:rPr>
+              <a:t>Put the Screenshots of the Registrations on this Template of </a:t>
+            </a:r>
+          </a:p>
+          <a:p>
+            <a:pPr algn="l">
+              <a:lnSpc>
+                <a:spcPts val="3646"/>
+              </a:lnSpc>
+              <a:spcBef>
+                <a:spcPct val="0"/>
+              </a:spcBef>
+            </a:pPr>
+            <a:r>
+              <a:rPr lang="en-US" sz="2604" b="1">
+                <a:solidFill>
+                  <a:srgbClr val="000000"/>
+                </a:solidFill>
+                <a:latin typeface="Times New Roman Bold"/>
+                <a:ea typeface="Times New Roman Bold"/>
+                <a:cs typeface="Times New Roman Bold"/>
+                <a:sym typeface="Times New Roman Bold"/>
+              </a:rPr>
+              <a:t>*ALL* the members on your team !</a:t>
+            </a:r>
+          </a:p>
+          <a:p>
+            <a:pPr algn="l">
+              <a:lnSpc>
+                <a:spcPts val="3646"/>
+              </a:lnSpc>
+              <a:spcBef>
+                <a:spcPct val="0"/>
+              </a:spcBef>
+            </a:pPr>
+            <a:endParaRPr lang="en-US" sz="2604" b="1">
+              <a:solidFill>
+                <a:srgbClr val="000000"/>
+              </a:solidFill>
+              <a:latin typeface="Times New Roman Bold"/>
+              <a:ea typeface="Times New Roman Bold"/>
+              <a:cs typeface="Times New Roman Bold"/>
+              <a:sym typeface="Times New Roman Bold"/>
+            </a:endParaRPr>
+          </a:p>
+        </p:txBody>
+      </p:sp>
+      <p:sp>
+        <p:nvSpPr>
+          <p:cNvPr id="15" name="TextBox 15"/>
+          <p:cNvSpPr txBox="1"/>
+          <p:nvPr/>
+        </p:nvSpPr>
+        <p:spPr>
+          <a:xfrm>
+            <a:off x="1173257" y="8457427"/>
+            <a:ext cx="8838699" cy="531811"/>
+          </a:xfrm>
+          <a:prstGeom prst="rect">
+            <a:avLst/>
+          </a:prstGeom>
+        </p:spPr>
+        <p:txBody>
+          <a:bodyPr lIns="0" tIns="0" rIns="0" bIns="0" rtlCol="0" anchor="t">
+            <a:spAutoFit/>
+          </a:bodyPr>
+          <a:lstStyle/>
+          <a:p>
+            <a:pPr algn="l">
+              <a:lnSpc>
+                <a:spcPts val="3866"/>
+              </a:lnSpc>
+            </a:pPr>
+            <a:r>
+              <a:rPr lang="en-US" sz="2761" b="1" u="sng">
+                <a:solidFill>
+                  <a:srgbClr val="000000"/>
+                </a:solidFill>
+                <a:latin typeface="Times New Roman Bold"/>
+                <a:ea typeface="Times New Roman Bold"/>
+                <a:cs typeface="Times New Roman Bold"/>
+                <a:sym typeface="Times New Roman Bold"/>
+                <a:hlinkClick r:id="rId4" tooltip="https://play.google.com/store/apps/details?id=com.instterra"/>
+              </a:rPr>
+              <a:t>https://play.google.com/store/apps/details?id=com.instterra</a:t>
+            </a:r>
+          </a:p>
+        </p:txBody>
+      </p:sp>
+      <p:sp>
+        <p:nvSpPr>
+          <p:cNvPr id="16" name="TextBox 16"/>
+          <p:cNvSpPr txBox="1"/>
+          <p:nvPr/>
+        </p:nvSpPr>
+        <p:spPr>
+          <a:xfrm>
+            <a:off x="1173257" y="7888461"/>
+            <a:ext cx="2880281" cy="440546"/>
+          </a:xfrm>
+          <a:prstGeom prst="rect">
+            <a:avLst/>
+          </a:prstGeom>
+        </p:spPr>
+        <p:txBody>
+          <a:bodyPr lIns="0" tIns="0" rIns="0" bIns="0" rtlCol="0" anchor="t">
+            <a:spAutoFit/>
+          </a:bodyPr>
+          <a:lstStyle/>
+          <a:p>
+            <a:pPr algn="ctr">
+              <a:lnSpc>
+                <a:spcPts val="3212"/>
+              </a:lnSpc>
+              <a:spcBef>
+                <a:spcPct val="0"/>
+              </a:spcBef>
+            </a:pPr>
+            <a:r>
+              <a:rPr lang="en-US" sz="2294" b="1">
+                <a:solidFill>
+                  <a:srgbClr val="000000"/>
+                </a:solidFill>
+                <a:latin typeface="Times New Roman Bold"/>
+                <a:ea typeface="Times New Roman Bold"/>
+                <a:cs typeface="Times New Roman Bold"/>
+                <a:sym typeface="Times New Roman Bold"/>
+              </a:rPr>
+              <a:t>Link For Registration : </a:t>
+            </a:r>
+          </a:p>
+        </p:txBody>
+      </p:sp>
+      <p:grpSp>
+        <p:nvGrpSpPr>
+          <p:cNvPr id="17" name="Group 17"/>
+          <p:cNvGrpSpPr/>
+          <p:nvPr/>
+        </p:nvGrpSpPr>
+        <p:grpSpPr>
+          <a:xfrm>
+            <a:off x="7028510" y="5289149"/>
+            <a:ext cx="3464462" cy="2180212"/>
+            <a:chOff x="0" y="0"/>
+            <a:chExt cx="912451" cy="574212"/>
+          </a:xfrm>
+        </p:grpSpPr>
+        <p:sp>
+          <p:nvSpPr>
+            <p:cNvPr id="18" name="Freeform 18"/>
+            <p:cNvSpPr/>
+            <p:nvPr/>
+          </p:nvSpPr>
+          <p:spPr>
+            <a:xfrm>
+              <a:off x="0" y="0"/>
+              <a:ext cx="912451" cy="574212"/>
+            </a:xfrm>
+            <a:custGeom>
+              <a:avLst/>
+              <a:gdLst/>
+              <a:ahLst/>
+              <a:cxnLst/>
+              <a:rect l="l" t="t" r="r" b="b"/>
+              <a:pathLst>
+                <a:path w="912451" h="574212">
+                  <a:moveTo>
+                    <a:pt x="0" y="0"/>
+                  </a:moveTo>
+                  <a:lnTo>
+                    <a:pt x="912451" y="0"/>
+                  </a:lnTo>
+                  <a:lnTo>
+                    <a:pt x="912451" y="574212"/>
+                  </a:lnTo>
+                  <a:lnTo>
+                    <a:pt x="0" y="574212"/>
+                  </a:lnTo>
+                  <a:close/>
+                </a:path>
+              </a:pathLst>
+            </a:custGeom>
+            <a:solidFill>
+              <a:srgbClr val="FFFFFF"/>
+            </a:solidFill>
+            <a:ln w="38100" cap="sq">
+              <a:solidFill>
+                <a:srgbClr val="000000"/>
+              </a:solidFill>
+              <a:prstDash val="solid"/>
+              <a:miter/>
+            </a:ln>
+          </p:spPr>
+          <p:txBody>
+            <a:bodyPr/>
+            <a:lstStyle/>
+            <a:p>
+              <a:endParaRPr lang="en-IN"/>
+            </a:p>
+          </p:txBody>
+        </p:sp>
+        <p:sp>
+          <p:nvSpPr>
+            <p:cNvPr id="19" name="TextBox 19"/>
+            <p:cNvSpPr txBox="1"/>
+            <p:nvPr/>
+          </p:nvSpPr>
+          <p:spPr>
+            <a:xfrm>
+              <a:off x="0" y="-38100"/>
+              <a:ext cx="912451" cy="612312"/>
+            </a:xfrm>
+            <a:prstGeom prst="rect">
+              <a:avLst/>
+            </a:prstGeom>
+          </p:spPr>
+          <p:txBody>
+            <a:bodyPr lIns="50800" tIns="50800" rIns="50800" bIns="50800" rtlCol="0" anchor="ctr"/>
+            <a:lstStyle/>
+            <a:p>
+              <a:pPr algn="ctr">
+                <a:lnSpc>
+                  <a:spcPts val="2659"/>
+                </a:lnSpc>
+              </a:pPr>
+              <a:r>
+                <a:rPr lang="en-US" sz="1899">
+                  <a:solidFill>
+                    <a:srgbClr val="000000"/>
+                  </a:solidFill>
+                  <a:latin typeface="Canva Sans"/>
+                  <a:ea typeface="Canva Sans"/>
+                  <a:cs typeface="Canva Sans"/>
+                  <a:sym typeface="Canva Sans"/>
+                </a:rPr>
+                <a:t>2</a:t>
+              </a:r>
+            </a:p>
+          </p:txBody>
+        </p:sp>
+      </p:grpSp>
+      <p:grpSp>
+        <p:nvGrpSpPr>
+          <p:cNvPr id="20" name="Group 20"/>
+          <p:cNvGrpSpPr/>
+          <p:nvPr/>
+        </p:nvGrpSpPr>
+        <p:grpSpPr>
+          <a:xfrm>
+            <a:off x="12940897" y="5289149"/>
+            <a:ext cx="3464462" cy="2180212"/>
+            <a:chOff x="0" y="0"/>
+            <a:chExt cx="912451" cy="574212"/>
+          </a:xfrm>
+        </p:grpSpPr>
+        <p:sp>
+          <p:nvSpPr>
+            <p:cNvPr id="21" name="Freeform 21"/>
+            <p:cNvSpPr/>
+            <p:nvPr/>
+          </p:nvSpPr>
+          <p:spPr>
+            <a:xfrm>
+              <a:off x="0" y="0"/>
+              <a:ext cx="912451" cy="574212"/>
+            </a:xfrm>
+            <a:custGeom>
+              <a:avLst/>
+              <a:gdLst/>
+              <a:ahLst/>
+              <a:cxnLst/>
+              <a:rect l="l" t="t" r="r" b="b"/>
+              <a:pathLst>
+                <a:path w="912451" h="574212">
+                  <a:moveTo>
+                    <a:pt x="0" y="0"/>
+                  </a:moveTo>
+                  <a:lnTo>
+                    <a:pt x="912451" y="0"/>
+                  </a:lnTo>
+                  <a:lnTo>
+                    <a:pt x="912451" y="574212"/>
+                  </a:lnTo>
+                  <a:lnTo>
+                    <a:pt x="0" y="574212"/>
+                  </a:lnTo>
+                  <a:close/>
+                </a:path>
+              </a:pathLst>
+            </a:custGeom>
+            <a:solidFill>
+              <a:srgbClr val="FFFFFF"/>
+            </a:solidFill>
+            <a:ln w="38100" cap="sq">
+              <a:solidFill>
+                <a:srgbClr val="000000"/>
+              </a:solidFill>
+              <a:prstDash val="solid"/>
+              <a:miter/>
+            </a:ln>
+          </p:spPr>
+          <p:txBody>
+            <a:bodyPr/>
+            <a:lstStyle/>
+            <a:p>
+              <a:endParaRPr lang="en-IN"/>
+            </a:p>
+          </p:txBody>
+        </p:sp>
+        <p:sp>
+          <p:nvSpPr>
+            <p:cNvPr id="22" name="TextBox 22"/>
+            <p:cNvSpPr txBox="1"/>
+            <p:nvPr/>
+          </p:nvSpPr>
+          <p:spPr>
+            <a:xfrm>
+              <a:off x="0" y="-38100"/>
+              <a:ext cx="912451" cy="612312"/>
+            </a:xfrm>
+            <a:prstGeom prst="rect">
+              <a:avLst/>
+            </a:prstGeom>
+          </p:spPr>
+          <p:txBody>
+            <a:bodyPr lIns="50800" tIns="50800" rIns="50800" bIns="50800" rtlCol="0" anchor="ctr"/>
+            <a:lstStyle/>
+            <a:p>
+              <a:pPr algn="ctr">
+                <a:lnSpc>
+                  <a:spcPts val="2659"/>
+                </a:lnSpc>
+              </a:pPr>
+              <a:r>
+                <a:rPr lang="en-US" sz="1899">
+                  <a:solidFill>
+                    <a:srgbClr val="000000"/>
+                  </a:solidFill>
+                  <a:latin typeface="Canva Sans"/>
+                  <a:ea typeface="Canva Sans"/>
+                  <a:cs typeface="Canva Sans"/>
+                  <a:sym typeface="Canva Sans"/>
+                </a:rPr>
+                <a:t>3</a:t>
+              </a:r>
+            </a:p>
+          </p:txBody>
+        </p:sp>
+      </p:grpSp>
+    </p:spTree>
+  </p:cSld>
+  <p:clrMapOvr>
+    <a:masterClrMapping/>
+  </p:clrMapOvr>
+</p:sld>
+</file>
+
+<file path=ppt/slides/slide8.xml><?xml version="1.0" encoding="utf-8"?>
 <p:sld xmlns:a="http://schemas.openxmlformats.org/drawingml/2006/main" xmlns:r="http://schemas.openxmlformats.org/officeDocument/2006/relationships" xmlns:p="http://schemas.openxmlformats.org/presentationml/2006/main">
   <p:cSld>
     <p:spTree>
@@ -5986,6 +7038,13 @@
               <a:srgbClr val="8B0000"/>
             </a:solidFill>
           </p:spPr>
+          <p:txBody>
+            <a:bodyPr/>
+            <a:lstStyle/>
+            <a:p>
+              <a:endParaRPr lang="en-IN"/>
+            </a:p>
+          </p:txBody>
         </p:sp>
         <p:sp>
           <p:nvSpPr>
@@ -6072,6 +7131,13 @@
               <a:srgbClr val="8B0000"/>
             </a:solidFill>
           </p:spPr>
+          <p:txBody>
+            <a:bodyPr/>
+            <a:lstStyle/>
+            <a:p>
+              <a:endParaRPr lang="en-IN"/>
+            </a:p>
+          </p:txBody>
         </p:sp>
         <p:sp>
           <p:nvSpPr>
@@ -6150,6 +7216,13 @@
             </a:stretch>
           </a:blipFill>
         </p:spPr>
+        <p:txBody>
+          <a:bodyPr/>
+          <a:lstStyle/>
+          <a:p>
+            <a:endParaRPr lang="en-IN"/>
+          </a:p>
+        </p:txBody>
       </p:sp>
       <p:sp>
         <p:nvSpPr>

</xml_diff>